<commit_message>
v1 of lab 300
</commit_message>
<xml_diff>
--- a/workshops/journey4-adwc/images/TitleImages.pptx
+++ b/workshops/journey4-adwc/images/TitleImages.pptx
@@ -8,11 +8,15 @@
     <p:sldId id="256" r:id="rId2"/>
     <p:sldId id="257" r:id="rId3"/>
     <p:sldId id="259" r:id="rId4"/>
-    <p:sldId id="260" r:id="rId5"/>
-    <p:sldId id="258" r:id="rId6"/>
+    <p:sldId id="261" r:id="rId5"/>
+    <p:sldId id="260" r:id="rId6"/>
+    <p:sldId id="258" r:id="rId7"/>
   </p:sldIdLst>
   <p:sldSz cx="12192000" cy="6858000"/>
   <p:notesSz cx="6858000" cy="9144000"/>
+  <p:custDataLst>
+    <p:tags r:id="rId8"/>
+  </p:custDataLst>
   <p:defaultTextStyle>
     <a:defPPr>
       <a:defRPr lang="en-US"/>
@@ -267,7 +271,7 @@
           <a:p>
             <a:fld id="{73F1DE3F-AD2E-4E31-AD04-7AD65E17B09F}" type="datetimeFigureOut">
               <a:rPr lang="en-US" smtClean="0"/>
-              <a:t>3/14/2018</a:t>
+              <a:t>2018-03-15</a:t>
             </a:fld>
             <a:endParaRPr lang="en-US"/>
           </a:p>
@@ -465,7 +469,7 @@
           <a:p>
             <a:fld id="{73F1DE3F-AD2E-4E31-AD04-7AD65E17B09F}" type="datetimeFigureOut">
               <a:rPr lang="en-US" smtClean="0"/>
-              <a:t>3/14/2018</a:t>
+              <a:t>2018-03-15</a:t>
             </a:fld>
             <a:endParaRPr lang="en-US"/>
           </a:p>
@@ -673,7 +677,7 @@
           <a:p>
             <a:fld id="{73F1DE3F-AD2E-4E31-AD04-7AD65E17B09F}" type="datetimeFigureOut">
               <a:rPr lang="en-US" smtClean="0"/>
-              <a:t>3/14/2018</a:t>
+              <a:t>2018-03-15</a:t>
             </a:fld>
             <a:endParaRPr lang="en-US"/>
           </a:p>
@@ -871,7 +875,7 @@
           <a:p>
             <a:fld id="{73F1DE3F-AD2E-4E31-AD04-7AD65E17B09F}" type="datetimeFigureOut">
               <a:rPr lang="en-US" smtClean="0"/>
-              <a:t>3/14/2018</a:t>
+              <a:t>2018-03-15</a:t>
             </a:fld>
             <a:endParaRPr lang="en-US"/>
           </a:p>
@@ -1146,7 +1150,7 @@
           <a:p>
             <a:fld id="{73F1DE3F-AD2E-4E31-AD04-7AD65E17B09F}" type="datetimeFigureOut">
               <a:rPr lang="en-US" smtClean="0"/>
-              <a:t>3/14/2018</a:t>
+              <a:t>2018-03-15</a:t>
             </a:fld>
             <a:endParaRPr lang="en-US"/>
           </a:p>
@@ -1411,7 +1415,7 @@
           <a:p>
             <a:fld id="{73F1DE3F-AD2E-4E31-AD04-7AD65E17B09F}" type="datetimeFigureOut">
               <a:rPr lang="en-US" smtClean="0"/>
-              <a:t>3/14/2018</a:t>
+              <a:t>2018-03-15</a:t>
             </a:fld>
             <a:endParaRPr lang="en-US"/>
           </a:p>
@@ -1823,7 +1827,7 @@
           <a:p>
             <a:fld id="{73F1DE3F-AD2E-4E31-AD04-7AD65E17B09F}" type="datetimeFigureOut">
               <a:rPr lang="en-US" smtClean="0"/>
-              <a:t>3/14/2018</a:t>
+              <a:t>2018-03-15</a:t>
             </a:fld>
             <a:endParaRPr lang="en-US"/>
           </a:p>
@@ -1964,7 +1968,7 @@
           <a:p>
             <a:fld id="{73F1DE3F-AD2E-4E31-AD04-7AD65E17B09F}" type="datetimeFigureOut">
               <a:rPr lang="en-US" smtClean="0"/>
-              <a:t>3/14/2018</a:t>
+              <a:t>2018-03-15</a:t>
             </a:fld>
             <a:endParaRPr lang="en-US"/>
           </a:p>
@@ -2077,7 +2081,7 @@
           <a:p>
             <a:fld id="{73F1DE3F-AD2E-4E31-AD04-7AD65E17B09F}" type="datetimeFigureOut">
               <a:rPr lang="en-US" smtClean="0"/>
-              <a:t>3/14/2018</a:t>
+              <a:t>2018-03-15</a:t>
             </a:fld>
             <a:endParaRPr lang="en-US"/>
           </a:p>
@@ -2388,7 +2392,7 @@
           <a:p>
             <a:fld id="{73F1DE3F-AD2E-4E31-AD04-7AD65E17B09F}" type="datetimeFigureOut">
               <a:rPr lang="en-US" smtClean="0"/>
-              <a:t>3/14/2018</a:t>
+              <a:t>2018-03-15</a:t>
             </a:fld>
             <a:endParaRPr lang="en-US"/>
           </a:p>
@@ -2676,7 +2680,7 @@
           <a:p>
             <a:fld id="{73F1DE3F-AD2E-4E31-AD04-7AD65E17B09F}" type="datetimeFigureOut">
               <a:rPr lang="en-US" smtClean="0"/>
-              <a:t>3/14/2018</a:t>
+              <a:t>2018-03-15</a:t>
             </a:fld>
             <a:endParaRPr lang="en-US"/>
           </a:p>
@@ -2917,7 +2921,7 @@
           <a:p>
             <a:fld id="{73F1DE3F-AD2E-4E31-AD04-7AD65E17B09F}" type="datetimeFigureOut">
               <a:rPr lang="en-US" smtClean="0"/>
-              <a:t>3/14/2018</a:t>
+              <a:t>2018-03-15</a:t>
             </a:fld>
             <a:endParaRPr lang="en-US"/>
           </a:p>
@@ -3349,7 +3353,7 @@
           <p:nvPr/>
         </p:nvPicPr>
         <p:blipFill>
-          <a:blip r:embed="rId2"/>
+          <a:blip r:embed="rId3"/>
           <a:stretch>
             <a:fillRect/>
           </a:stretch>
@@ -3447,6 +3451,9 @@
         </p:txBody>
       </p:sp>
     </p:spTree>
+    <p:custDataLst>
+      <p:tags r:id="rId1"/>
+    </p:custDataLst>
     <p:extLst>
       <p:ext uri="{BB962C8B-B14F-4D97-AF65-F5344CB8AC3E}">
         <p14:creationId xmlns:p14="http://schemas.microsoft.com/office/powerpoint/2010/main" val="3153043138"/>
@@ -3491,7 +3498,7 @@
           <p:nvPr/>
         </p:nvPicPr>
         <p:blipFill>
-          <a:blip r:embed="rId2"/>
+          <a:blip r:embed="rId3"/>
           <a:stretch>
             <a:fillRect/>
           </a:stretch>
@@ -3604,6 +3611,9 @@
         </p:txBody>
       </p:sp>
     </p:spTree>
+    <p:custDataLst>
+      <p:tags r:id="rId1"/>
+    </p:custDataLst>
     <p:extLst>
       <p:ext uri="{BB962C8B-B14F-4D97-AF65-F5344CB8AC3E}">
         <p14:creationId xmlns:p14="http://schemas.microsoft.com/office/powerpoint/2010/main" val="815895125"/>
@@ -3648,7 +3658,7 @@
           <p:nvPr/>
         </p:nvPicPr>
         <p:blipFill>
-          <a:blip r:embed="rId2"/>
+          <a:blip r:embed="rId3"/>
           <a:stretch>
             <a:fillRect/>
           </a:stretch>
@@ -3768,6 +3778,9 @@
         </p:txBody>
       </p:sp>
     </p:spTree>
+    <p:custDataLst>
+      <p:tags r:id="rId1"/>
+    </p:custDataLst>
     <p:extLst>
       <p:ext uri="{BB962C8B-B14F-4D97-AF65-F5344CB8AC3E}">
         <p14:creationId xmlns:p14="http://schemas.microsoft.com/office/powerpoint/2010/main" val="41166499"/>
@@ -3812,7 +3825,7 @@
           <p:nvPr/>
         </p:nvPicPr>
         <p:blipFill>
-          <a:blip r:embed="rId2"/>
+          <a:blip r:embed="rId3"/>
           <a:stretch>
             <a:fillRect/>
           </a:stretch>
@@ -3882,8 +3895,8 @@
         </p:nvSpPr>
         <p:spPr>
           <a:xfrm>
-            <a:off x="6406897" y="991743"/>
-            <a:ext cx="4477996" cy="4832092"/>
+            <a:off x="6340979" y="1285519"/>
+            <a:ext cx="4477996" cy="3477875"/>
           </a:xfrm>
           <a:prstGeom prst="rect">
             <a:avLst/>
@@ -3913,21 +3926,33 @@
           <a:p>
             <a:r>
               <a:rPr lang="en-US" sz="4400" b="1" dirty="0"/>
-              <a:t>Lab 500:</a:t>
-            </a:r>
-          </a:p>
-          <a:p>
+              <a:t>Lab </a:t>
+            </a:r>
+            <a:r>
+              <a:rPr lang="en-US" sz="4400" b="1" dirty="0" smtClean="0"/>
+              <a:t>300</a:t>
+            </a:r>
             <a:r>
               <a:rPr lang="en-US" sz="4400" b="1" dirty="0"/>
-              <a:t>Managing and Monitoring via Cloud Console</a:t>
-            </a:r>
+              <a:t>:</a:t>
+            </a:r>
+          </a:p>
+          <a:p>
+            <a:r>
+              <a:rPr lang="en-US" sz="4400" b="1" dirty="0" smtClean="0"/>
+              <a:t>Data Loading</a:t>
+            </a:r>
+            <a:endParaRPr lang="en-US" sz="4400" b="1" dirty="0"/>
           </a:p>
         </p:txBody>
       </p:sp>
     </p:spTree>
+    <p:custDataLst>
+      <p:tags r:id="rId1"/>
+    </p:custDataLst>
     <p:extLst>
       <p:ext uri="{BB962C8B-B14F-4D97-AF65-F5344CB8AC3E}">
-        <p14:creationId xmlns:p14="http://schemas.microsoft.com/office/powerpoint/2010/main" val="3677148773"/>
+        <p14:creationId xmlns:p14="http://schemas.microsoft.com/office/powerpoint/2010/main" val="3155604627"/>
       </p:ext>
     </p:extLst>
   </p:cSld>
@@ -3969,7 +3994,7 @@
           <p:nvPr/>
         </p:nvPicPr>
         <p:blipFill>
-          <a:blip r:embed="rId2"/>
+          <a:blip r:embed="rId3"/>
           <a:stretch>
             <a:fillRect/>
           </a:stretch>
@@ -4039,6 +4064,166 @@
         </p:nvSpPr>
         <p:spPr>
           <a:xfrm>
+            <a:off x="6406897" y="991743"/>
+            <a:ext cx="4477996" cy="4832092"/>
+          </a:xfrm>
+          <a:prstGeom prst="rect">
+            <a:avLst/>
+          </a:prstGeom>
+          <a:noFill/>
+        </p:spPr>
+        <p:txBody>
+          <a:bodyPr wrap="square" rtlCol="0">
+            <a:spAutoFit/>
+          </a:bodyPr>
+          <a:lstStyle/>
+          <a:p>
+            <a:r>
+              <a:rPr lang="en-US" sz="4400" b="1" dirty="0"/>
+              <a:t>Test Drive</a:t>
+            </a:r>
+          </a:p>
+          <a:p>
+            <a:r>
+              <a:rPr lang="en-US" sz="4400" b="1" dirty="0"/>
+              <a:t>Workshop</a:t>
+            </a:r>
+          </a:p>
+          <a:p>
+            <a:endParaRPr lang="en-US" sz="4400" b="1" dirty="0"/>
+          </a:p>
+          <a:p>
+            <a:r>
+              <a:rPr lang="en-US" sz="4400" b="1" dirty="0"/>
+              <a:t>Lab 500:</a:t>
+            </a:r>
+          </a:p>
+          <a:p>
+            <a:r>
+              <a:rPr lang="en-US" sz="4400" b="1" dirty="0"/>
+              <a:t>Managing and Monitoring via Cloud Console</a:t>
+            </a:r>
+          </a:p>
+        </p:txBody>
+      </p:sp>
+    </p:spTree>
+    <p:custDataLst>
+      <p:tags r:id="rId1"/>
+    </p:custDataLst>
+    <p:extLst>
+      <p:ext uri="{BB962C8B-B14F-4D97-AF65-F5344CB8AC3E}">
+        <p14:creationId xmlns:p14="http://schemas.microsoft.com/office/powerpoint/2010/main" val="3677148773"/>
+      </p:ext>
+    </p:extLst>
+  </p:cSld>
+  <p:clrMapOvr>
+    <a:masterClrMapping/>
+  </p:clrMapOvr>
+</p:sld>
+</file>
+
+<file path=ppt/slides/slide6.xml><?xml version="1.0" encoding="utf-8"?>
+<p:sld xmlns:a="http://schemas.openxmlformats.org/drawingml/2006/main" xmlns:r="http://schemas.openxmlformats.org/officeDocument/2006/relationships" xmlns:p="http://schemas.openxmlformats.org/presentationml/2006/main">
+  <p:cSld>
+    <p:spTree>
+      <p:nvGrpSpPr>
+        <p:cNvPr id="1" name=""/>
+        <p:cNvGrpSpPr/>
+        <p:nvPr/>
+      </p:nvGrpSpPr>
+      <p:grpSpPr>
+        <a:xfrm>
+          <a:off x="0" y="0"/>
+          <a:ext cx="0" cy="0"/>
+          <a:chOff x="0" y="0"/>
+          <a:chExt cx="0" cy="0"/>
+        </a:xfrm>
+      </p:grpSpPr>
+      <p:pic>
+        <p:nvPicPr>
+          <p:cNvPr id="4" name="Picture 3">
+            <a:extLst>
+              <a:ext uri="{FF2B5EF4-FFF2-40B4-BE49-F238E27FC236}">
+                <a16:creationId xmlns:a16="http://schemas.microsoft.com/office/drawing/2014/main" id="{BC386614-F891-4DD1-AD89-9D8EC3844E7A}"/>
+              </a:ext>
+            </a:extLst>
+          </p:cNvPr>
+          <p:cNvPicPr>
+            <a:picLocks noChangeAspect="1"/>
+          </p:cNvPicPr>
+          <p:nvPr/>
+        </p:nvPicPr>
+        <p:blipFill>
+          <a:blip r:embed="rId3"/>
+          <a:stretch>
+            <a:fillRect/>
+          </a:stretch>
+        </p:blipFill>
+        <p:spPr>
+          <a:xfrm>
+            <a:off x="1479819" y="986821"/>
+            <a:ext cx="4047619" cy="4752381"/>
+          </a:xfrm>
+          <a:prstGeom prst="rect">
+            <a:avLst/>
+          </a:prstGeom>
+        </p:spPr>
+      </p:pic>
+      <p:cxnSp>
+        <p:nvCxnSpPr>
+          <p:cNvPr id="6" name="Straight Connector 5">
+            <a:extLst>
+              <a:ext uri="{FF2B5EF4-FFF2-40B4-BE49-F238E27FC236}">
+                <a16:creationId xmlns:a16="http://schemas.microsoft.com/office/drawing/2014/main" id="{776EEA6E-EA78-4AFE-BBAA-69FEEA6C6260}"/>
+              </a:ext>
+            </a:extLst>
+          </p:cNvPr>
+          <p:cNvCxnSpPr/>
+          <p:nvPr/>
+        </p:nvCxnSpPr>
+        <p:spPr>
+          <a:xfrm>
+            <a:off x="5967167" y="1187777"/>
+            <a:ext cx="0" cy="4440025"/>
+          </a:xfrm>
+          <a:prstGeom prst="line">
+            <a:avLst/>
+          </a:prstGeom>
+          <a:ln w="76200">
+            <a:solidFill>
+              <a:schemeClr val="tx1"/>
+            </a:solidFill>
+          </a:ln>
+        </p:spPr>
+        <p:style>
+          <a:lnRef idx="1">
+            <a:schemeClr val="accent1"/>
+          </a:lnRef>
+          <a:fillRef idx="0">
+            <a:schemeClr val="accent1"/>
+          </a:fillRef>
+          <a:effectRef idx="0">
+            <a:schemeClr val="accent1"/>
+          </a:effectRef>
+          <a:fontRef idx="minor">
+            <a:schemeClr val="tx1"/>
+          </a:fontRef>
+        </p:style>
+      </p:cxnSp>
+      <p:sp>
+        <p:nvSpPr>
+          <p:cNvPr id="7" name="TextBox 6">
+            <a:extLst>
+              <a:ext uri="{FF2B5EF4-FFF2-40B4-BE49-F238E27FC236}">
+                <a16:creationId xmlns:a16="http://schemas.microsoft.com/office/drawing/2014/main" id="{12DD9BC4-752C-4261-B472-C317EDF9DCE4}"/>
+              </a:ext>
+            </a:extLst>
+          </p:cNvPr>
+          <p:cNvSpPr txBox="1"/>
+          <p:nvPr/>
+        </p:nvSpPr>
+        <p:spPr>
+          <a:xfrm>
             <a:off x="6340979" y="1285519"/>
             <a:ext cx="4477996" cy="4154984"/>
           </a:xfrm>
@@ -4082,6 +4267,9 @@
         </p:txBody>
       </p:sp>
     </p:spTree>
+    <p:custDataLst>
+      <p:tags r:id="rId1"/>
+    </p:custDataLst>
     <p:extLst>
       <p:ext uri="{BB962C8B-B14F-4D97-AF65-F5344CB8AC3E}">
         <p14:creationId xmlns:p14="http://schemas.microsoft.com/office/powerpoint/2010/main" val="862014506"/>
@@ -4092,6 +4280,49 @@
     <a:masterClrMapping/>
   </p:clrMapOvr>
 </p:sld>
+</file>
+
+<file path=ppt/tags/tag1.xml><?xml version="1.0" encoding="utf-8"?>
+<p:tagLst xmlns:a="http://schemas.openxmlformats.org/drawingml/2006/main" xmlns:r="http://schemas.openxmlformats.org/officeDocument/2006/relationships" xmlns:p="http://schemas.openxmlformats.org/presentationml/2006/main">
+  <p:tag name="ARTICULATE_PROJECT_OPEN" val="0"/>
+  <p:tag name="ARTICULATE_SLIDE_COUNT" val="6"/>
+</p:tagLst>
+</file>
+
+<file path=ppt/tags/tag2.xml><?xml version="1.0" encoding="utf-8"?>
+<p:tagLst xmlns:a="http://schemas.openxmlformats.org/drawingml/2006/main" xmlns:r="http://schemas.openxmlformats.org/officeDocument/2006/relationships" xmlns:p="http://schemas.openxmlformats.org/presentationml/2006/main">
+  <p:tag name="ARTICULATE_SLIDE_THUMBNAIL_REFRESH" val="1"/>
+</p:tagLst>
+</file>
+
+<file path=ppt/tags/tag3.xml><?xml version="1.0" encoding="utf-8"?>
+<p:tagLst xmlns:a="http://schemas.openxmlformats.org/drawingml/2006/main" xmlns:r="http://schemas.openxmlformats.org/officeDocument/2006/relationships" xmlns:p="http://schemas.openxmlformats.org/presentationml/2006/main">
+  <p:tag name="ARTICULATE_SLIDE_THUMBNAIL_REFRESH" val="1"/>
+</p:tagLst>
+</file>
+
+<file path=ppt/tags/tag4.xml><?xml version="1.0" encoding="utf-8"?>
+<p:tagLst xmlns:a="http://schemas.openxmlformats.org/drawingml/2006/main" xmlns:r="http://schemas.openxmlformats.org/officeDocument/2006/relationships" xmlns:p="http://schemas.openxmlformats.org/presentationml/2006/main">
+  <p:tag name="ARTICULATE_SLIDE_THUMBNAIL_REFRESH" val="1"/>
+</p:tagLst>
+</file>
+
+<file path=ppt/tags/tag5.xml><?xml version="1.0" encoding="utf-8"?>
+<p:tagLst xmlns:a="http://schemas.openxmlformats.org/drawingml/2006/main" xmlns:r="http://schemas.openxmlformats.org/officeDocument/2006/relationships" xmlns:p="http://schemas.openxmlformats.org/presentationml/2006/main">
+  <p:tag name="ARTICULATE_SLIDE_THUMBNAIL_REFRESH" val="1"/>
+</p:tagLst>
+</file>
+
+<file path=ppt/tags/tag6.xml><?xml version="1.0" encoding="utf-8"?>
+<p:tagLst xmlns:a="http://schemas.openxmlformats.org/drawingml/2006/main" xmlns:r="http://schemas.openxmlformats.org/officeDocument/2006/relationships" xmlns:p="http://schemas.openxmlformats.org/presentationml/2006/main">
+  <p:tag name="ARTICULATE_SLIDE_THUMBNAIL_REFRESH" val="1"/>
+</p:tagLst>
+</file>
+
+<file path=ppt/tags/tag7.xml><?xml version="1.0" encoding="utf-8"?>
+<p:tagLst xmlns:a="http://schemas.openxmlformats.org/drawingml/2006/main" xmlns:r="http://schemas.openxmlformats.org/officeDocument/2006/relationships" xmlns:p="http://schemas.openxmlformats.org/presentationml/2006/main">
+  <p:tag name="ARTICULATE_SLIDE_THUMBNAIL_REFRESH" val="1"/>
+</p:tagLst>
 </file>
 
 <file path=ppt/theme/theme1.xml><?xml version="1.0" encoding="utf-8"?>

</xml_diff>

<commit_message>
add lab 400 querying external data
</commit_message>
<xml_diff>
--- a/workshops/journey4-adwc/images/TitleImages.pptx
+++ b/workshops/journey4-adwc/images/TitleImages.pptx
@@ -9,13 +9,14 @@
     <p:sldId id="257" r:id="rId3"/>
     <p:sldId id="259" r:id="rId4"/>
     <p:sldId id="261" r:id="rId5"/>
-    <p:sldId id="260" r:id="rId6"/>
-    <p:sldId id="258" r:id="rId7"/>
+    <p:sldId id="262" r:id="rId6"/>
+    <p:sldId id="260" r:id="rId7"/>
+    <p:sldId id="258" r:id="rId8"/>
   </p:sldIdLst>
   <p:sldSz cx="12192000" cy="6858000"/>
   <p:notesSz cx="6858000" cy="9144000"/>
   <p:custDataLst>
-    <p:tags r:id="rId8"/>
+    <p:tags r:id="rId9"/>
   </p:custDataLst>
   <p:defaultTextStyle>
     <a:defPPr>
@@ -271,7 +272,7 @@
           <a:p>
             <a:fld id="{73F1DE3F-AD2E-4E31-AD04-7AD65E17B09F}" type="datetimeFigureOut">
               <a:rPr lang="en-US" smtClean="0"/>
-              <a:t>2018-03-15</a:t>
+              <a:t>2018-03-19</a:t>
             </a:fld>
             <a:endParaRPr lang="en-US"/>
           </a:p>
@@ -469,7 +470,7 @@
           <a:p>
             <a:fld id="{73F1DE3F-AD2E-4E31-AD04-7AD65E17B09F}" type="datetimeFigureOut">
               <a:rPr lang="en-US" smtClean="0"/>
-              <a:t>2018-03-15</a:t>
+              <a:t>2018-03-19</a:t>
             </a:fld>
             <a:endParaRPr lang="en-US"/>
           </a:p>
@@ -677,7 +678,7 @@
           <a:p>
             <a:fld id="{73F1DE3F-AD2E-4E31-AD04-7AD65E17B09F}" type="datetimeFigureOut">
               <a:rPr lang="en-US" smtClean="0"/>
-              <a:t>2018-03-15</a:t>
+              <a:t>2018-03-19</a:t>
             </a:fld>
             <a:endParaRPr lang="en-US"/>
           </a:p>
@@ -875,7 +876,7 @@
           <a:p>
             <a:fld id="{73F1DE3F-AD2E-4E31-AD04-7AD65E17B09F}" type="datetimeFigureOut">
               <a:rPr lang="en-US" smtClean="0"/>
-              <a:t>2018-03-15</a:t>
+              <a:t>2018-03-19</a:t>
             </a:fld>
             <a:endParaRPr lang="en-US"/>
           </a:p>
@@ -1150,7 +1151,7 @@
           <a:p>
             <a:fld id="{73F1DE3F-AD2E-4E31-AD04-7AD65E17B09F}" type="datetimeFigureOut">
               <a:rPr lang="en-US" smtClean="0"/>
-              <a:t>2018-03-15</a:t>
+              <a:t>2018-03-19</a:t>
             </a:fld>
             <a:endParaRPr lang="en-US"/>
           </a:p>
@@ -1415,7 +1416,7 @@
           <a:p>
             <a:fld id="{73F1DE3F-AD2E-4E31-AD04-7AD65E17B09F}" type="datetimeFigureOut">
               <a:rPr lang="en-US" smtClean="0"/>
-              <a:t>2018-03-15</a:t>
+              <a:t>2018-03-19</a:t>
             </a:fld>
             <a:endParaRPr lang="en-US"/>
           </a:p>
@@ -1827,7 +1828,7 @@
           <a:p>
             <a:fld id="{73F1DE3F-AD2E-4E31-AD04-7AD65E17B09F}" type="datetimeFigureOut">
               <a:rPr lang="en-US" smtClean="0"/>
-              <a:t>2018-03-15</a:t>
+              <a:t>2018-03-19</a:t>
             </a:fld>
             <a:endParaRPr lang="en-US"/>
           </a:p>
@@ -1968,7 +1969,7 @@
           <a:p>
             <a:fld id="{73F1DE3F-AD2E-4E31-AD04-7AD65E17B09F}" type="datetimeFigureOut">
               <a:rPr lang="en-US" smtClean="0"/>
-              <a:t>2018-03-15</a:t>
+              <a:t>2018-03-19</a:t>
             </a:fld>
             <a:endParaRPr lang="en-US"/>
           </a:p>
@@ -2081,7 +2082,7 @@
           <a:p>
             <a:fld id="{73F1DE3F-AD2E-4E31-AD04-7AD65E17B09F}" type="datetimeFigureOut">
               <a:rPr lang="en-US" smtClean="0"/>
-              <a:t>2018-03-15</a:t>
+              <a:t>2018-03-19</a:t>
             </a:fld>
             <a:endParaRPr lang="en-US"/>
           </a:p>
@@ -2392,7 +2393,7 @@
           <a:p>
             <a:fld id="{73F1DE3F-AD2E-4E31-AD04-7AD65E17B09F}" type="datetimeFigureOut">
               <a:rPr lang="en-US" smtClean="0"/>
-              <a:t>2018-03-15</a:t>
+              <a:t>2018-03-19</a:t>
             </a:fld>
             <a:endParaRPr lang="en-US"/>
           </a:p>
@@ -2680,7 +2681,7 @@
           <a:p>
             <a:fld id="{73F1DE3F-AD2E-4E31-AD04-7AD65E17B09F}" type="datetimeFigureOut">
               <a:rPr lang="en-US" smtClean="0"/>
-              <a:t>2018-03-15</a:t>
+              <a:t>2018-03-19</a:t>
             </a:fld>
             <a:endParaRPr lang="en-US"/>
           </a:p>
@@ -2921,7 +2922,7 @@
           <a:p>
             <a:fld id="{73F1DE3F-AD2E-4E31-AD04-7AD65E17B09F}" type="datetimeFigureOut">
               <a:rPr lang="en-US" smtClean="0"/>
-              <a:t>2018-03-15</a:t>
+              <a:t>2018-03-19</a:t>
             </a:fld>
             <a:endParaRPr lang="en-US"/>
           </a:p>
@@ -4064,8 +4065,8 @@
         </p:nvSpPr>
         <p:spPr>
           <a:xfrm>
-            <a:off x="6406897" y="991743"/>
-            <a:ext cx="4477996" cy="4832092"/>
+            <a:off x="6340978" y="1285519"/>
+            <a:ext cx="5715555" cy="3477875"/>
           </a:xfrm>
           <a:prstGeom prst="rect">
             <a:avLst/>
@@ -4095,14 +4096,23 @@
           <a:p>
             <a:r>
               <a:rPr lang="en-US" sz="4400" b="1" dirty="0"/>
-              <a:t>Lab 500:</a:t>
-            </a:r>
-          </a:p>
-          <a:p>
+              <a:t>Lab </a:t>
+            </a:r>
+            <a:r>
+              <a:rPr lang="en-US" sz="4400" b="1" dirty="0" smtClean="0"/>
+              <a:t>400</a:t>
+            </a:r>
             <a:r>
               <a:rPr lang="en-US" sz="4400" b="1" dirty="0"/>
-              <a:t>Managing and Monitoring via Cloud Console</a:t>
-            </a:r>
+              <a:t>:</a:t>
+            </a:r>
+          </a:p>
+          <a:p>
+            <a:r>
+              <a:rPr lang="en-US" sz="4400" b="1" dirty="0" smtClean="0"/>
+              <a:t>Querying External Data</a:t>
+            </a:r>
+            <a:endParaRPr lang="en-US" sz="4400" b="1" dirty="0"/>
           </a:p>
         </p:txBody>
       </p:sp>
@@ -4112,7 +4122,7 @@
     </p:custDataLst>
     <p:extLst>
       <p:ext uri="{BB962C8B-B14F-4D97-AF65-F5344CB8AC3E}">
-        <p14:creationId xmlns:p14="http://schemas.microsoft.com/office/powerpoint/2010/main" val="3677148773"/>
+        <p14:creationId xmlns:p14="http://schemas.microsoft.com/office/powerpoint/2010/main" val="3292069661"/>
       </p:ext>
     </p:extLst>
   </p:cSld>
@@ -4224,6 +4234,166 @@
         </p:nvSpPr>
         <p:spPr>
           <a:xfrm>
+            <a:off x="6406897" y="991743"/>
+            <a:ext cx="4477996" cy="4832092"/>
+          </a:xfrm>
+          <a:prstGeom prst="rect">
+            <a:avLst/>
+          </a:prstGeom>
+          <a:noFill/>
+        </p:spPr>
+        <p:txBody>
+          <a:bodyPr wrap="square" rtlCol="0">
+            <a:spAutoFit/>
+          </a:bodyPr>
+          <a:lstStyle/>
+          <a:p>
+            <a:r>
+              <a:rPr lang="en-US" sz="4400" b="1" dirty="0"/>
+              <a:t>Test Drive</a:t>
+            </a:r>
+          </a:p>
+          <a:p>
+            <a:r>
+              <a:rPr lang="en-US" sz="4400" b="1" dirty="0"/>
+              <a:t>Workshop</a:t>
+            </a:r>
+          </a:p>
+          <a:p>
+            <a:endParaRPr lang="en-US" sz="4400" b="1" dirty="0"/>
+          </a:p>
+          <a:p>
+            <a:r>
+              <a:rPr lang="en-US" sz="4400" b="1" dirty="0"/>
+              <a:t>Lab 500:</a:t>
+            </a:r>
+          </a:p>
+          <a:p>
+            <a:r>
+              <a:rPr lang="en-US" sz="4400" b="1" dirty="0"/>
+              <a:t>Managing and Monitoring via Cloud Console</a:t>
+            </a:r>
+          </a:p>
+        </p:txBody>
+      </p:sp>
+    </p:spTree>
+    <p:custDataLst>
+      <p:tags r:id="rId1"/>
+    </p:custDataLst>
+    <p:extLst>
+      <p:ext uri="{BB962C8B-B14F-4D97-AF65-F5344CB8AC3E}">
+        <p14:creationId xmlns:p14="http://schemas.microsoft.com/office/powerpoint/2010/main" val="3677148773"/>
+      </p:ext>
+    </p:extLst>
+  </p:cSld>
+  <p:clrMapOvr>
+    <a:masterClrMapping/>
+  </p:clrMapOvr>
+</p:sld>
+</file>
+
+<file path=ppt/slides/slide7.xml><?xml version="1.0" encoding="utf-8"?>
+<p:sld xmlns:a="http://schemas.openxmlformats.org/drawingml/2006/main" xmlns:r="http://schemas.openxmlformats.org/officeDocument/2006/relationships" xmlns:p="http://schemas.openxmlformats.org/presentationml/2006/main">
+  <p:cSld>
+    <p:spTree>
+      <p:nvGrpSpPr>
+        <p:cNvPr id="1" name=""/>
+        <p:cNvGrpSpPr/>
+        <p:nvPr/>
+      </p:nvGrpSpPr>
+      <p:grpSpPr>
+        <a:xfrm>
+          <a:off x="0" y="0"/>
+          <a:ext cx="0" cy="0"/>
+          <a:chOff x="0" y="0"/>
+          <a:chExt cx="0" cy="0"/>
+        </a:xfrm>
+      </p:grpSpPr>
+      <p:pic>
+        <p:nvPicPr>
+          <p:cNvPr id="4" name="Picture 3">
+            <a:extLst>
+              <a:ext uri="{FF2B5EF4-FFF2-40B4-BE49-F238E27FC236}">
+                <a16:creationId xmlns:a16="http://schemas.microsoft.com/office/drawing/2014/main" id="{BC386614-F891-4DD1-AD89-9D8EC3844E7A}"/>
+              </a:ext>
+            </a:extLst>
+          </p:cNvPr>
+          <p:cNvPicPr>
+            <a:picLocks noChangeAspect="1"/>
+          </p:cNvPicPr>
+          <p:nvPr/>
+        </p:nvPicPr>
+        <p:blipFill>
+          <a:blip r:embed="rId3"/>
+          <a:stretch>
+            <a:fillRect/>
+          </a:stretch>
+        </p:blipFill>
+        <p:spPr>
+          <a:xfrm>
+            <a:off x="1479819" y="986821"/>
+            <a:ext cx="4047619" cy="4752381"/>
+          </a:xfrm>
+          <a:prstGeom prst="rect">
+            <a:avLst/>
+          </a:prstGeom>
+        </p:spPr>
+      </p:pic>
+      <p:cxnSp>
+        <p:nvCxnSpPr>
+          <p:cNvPr id="6" name="Straight Connector 5">
+            <a:extLst>
+              <a:ext uri="{FF2B5EF4-FFF2-40B4-BE49-F238E27FC236}">
+                <a16:creationId xmlns:a16="http://schemas.microsoft.com/office/drawing/2014/main" id="{776EEA6E-EA78-4AFE-BBAA-69FEEA6C6260}"/>
+              </a:ext>
+            </a:extLst>
+          </p:cNvPr>
+          <p:cNvCxnSpPr/>
+          <p:nvPr/>
+        </p:nvCxnSpPr>
+        <p:spPr>
+          <a:xfrm>
+            <a:off x="5967167" y="1187777"/>
+            <a:ext cx="0" cy="4440025"/>
+          </a:xfrm>
+          <a:prstGeom prst="line">
+            <a:avLst/>
+          </a:prstGeom>
+          <a:ln w="76200">
+            <a:solidFill>
+              <a:schemeClr val="tx1"/>
+            </a:solidFill>
+          </a:ln>
+        </p:spPr>
+        <p:style>
+          <a:lnRef idx="1">
+            <a:schemeClr val="accent1"/>
+          </a:lnRef>
+          <a:fillRef idx="0">
+            <a:schemeClr val="accent1"/>
+          </a:fillRef>
+          <a:effectRef idx="0">
+            <a:schemeClr val="accent1"/>
+          </a:effectRef>
+          <a:fontRef idx="minor">
+            <a:schemeClr val="tx1"/>
+          </a:fontRef>
+        </p:style>
+      </p:cxnSp>
+      <p:sp>
+        <p:nvSpPr>
+          <p:cNvPr id="7" name="TextBox 6">
+            <a:extLst>
+              <a:ext uri="{FF2B5EF4-FFF2-40B4-BE49-F238E27FC236}">
+                <a16:creationId xmlns:a16="http://schemas.microsoft.com/office/drawing/2014/main" id="{12DD9BC4-752C-4261-B472-C317EDF9DCE4}"/>
+              </a:ext>
+            </a:extLst>
+          </p:cNvPr>
+          <p:cNvSpPr txBox="1"/>
+          <p:nvPr/>
+        </p:nvSpPr>
+        <p:spPr>
+          <a:xfrm>
             <a:off x="6340979" y="1285519"/>
             <a:ext cx="4477996" cy="4154984"/>
           </a:xfrm>
@@ -4285,7 +4455,7 @@
 <file path=ppt/tags/tag1.xml><?xml version="1.0" encoding="utf-8"?>
 <p:tagLst xmlns:a="http://schemas.openxmlformats.org/drawingml/2006/main" xmlns:r="http://schemas.openxmlformats.org/officeDocument/2006/relationships" xmlns:p="http://schemas.openxmlformats.org/presentationml/2006/main">
   <p:tag name="ARTICULATE_PROJECT_OPEN" val="0"/>
-  <p:tag name="ARTICULATE_SLIDE_COUNT" val="6"/>
+  <p:tag name="ARTICULATE_SLIDE_COUNT" val="7"/>
 </p:tagLst>
 </file>
 
@@ -4320,6 +4490,12 @@
 </file>
 
 <file path=ppt/tags/tag7.xml><?xml version="1.0" encoding="utf-8"?>
+<p:tagLst xmlns:a="http://schemas.openxmlformats.org/drawingml/2006/main" xmlns:r="http://schemas.openxmlformats.org/officeDocument/2006/relationships" xmlns:p="http://schemas.openxmlformats.org/presentationml/2006/main">
+  <p:tag name="ARTICULATE_SLIDE_THUMBNAIL_REFRESH" val="1"/>
+</p:tagLst>
+</file>
+
+<file path=ppt/tags/tag8.xml><?xml version="1.0" encoding="utf-8"?>
 <p:tagLst xmlns:a="http://schemas.openxmlformats.org/drawingml/2006/main" xmlns:r="http://schemas.openxmlformats.org/officeDocument/2006/relationships" xmlns:p="http://schemas.openxmlformats.org/presentationml/2006/main">
   <p:tag name="ARTICULATE_SLIDE_THUMBNAIL_REFRESH" val="1"/>
 </p:tagLst>

</xml_diff>

<commit_message>
Updated with 900 Lab Image
</commit_message>
<xml_diff>
--- a/workshops/journey4-adwc/images/TitleImages.pptx
+++ b/workshops/journey4-adwc/images/TitleImages.pptx
@@ -14,11 +14,12 @@
     <p:sldId id="258" r:id="rId8"/>
     <p:sldId id="263" r:id="rId9"/>
     <p:sldId id="264" r:id="rId10"/>
+    <p:sldId id="265" r:id="rId11"/>
   </p:sldIdLst>
   <p:sldSz cx="12192000" cy="6858000"/>
   <p:notesSz cx="6858000" cy="9144000"/>
   <p:custDataLst>
-    <p:tags r:id="rId11"/>
+    <p:tags r:id="rId12"/>
   </p:custDataLst>
   <p:defaultTextStyle>
     <a:defPPr>
@@ -274,7 +275,7 @@
           <a:p>
             <a:fld id="{73F1DE3F-AD2E-4E31-AD04-7AD65E17B09F}" type="datetimeFigureOut">
               <a:rPr lang="en-US" smtClean="0"/>
-              <a:t>3/27/2018</a:t>
+              <a:t>7/9/2018</a:t>
             </a:fld>
             <a:endParaRPr lang="en-US"/>
           </a:p>
@@ -472,7 +473,7 @@
           <a:p>
             <a:fld id="{73F1DE3F-AD2E-4E31-AD04-7AD65E17B09F}" type="datetimeFigureOut">
               <a:rPr lang="en-US" smtClean="0"/>
-              <a:t>3/27/2018</a:t>
+              <a:t>7/9/2018</a:t>
             </a:fld>
             <a:endParaRPr lang="en-US"/>
           </a:p>
@@ -680,7 +681,7 @@
           <a:p>
             <a:fld id="{73F1DE3F-AD2E-4E31-AD04-7AD65E17B09F}" type="datetimeFigureOut">
               <a:rPr lang="en-US" smtClean="0"/>
-              <a:t>3/27/2018</a:t>
+              <a:t>7/9/2018</a:t>
             </a:fld>
             <a:endParaRPr lang="en-US"/>
           </a:p>
@@ -878,7 +879,7 @@
           <a:p>
             <a:fld id="{73F1DE3F-AD2E-4E31-AD04-7AD65E17B09F}" type="datetimeFigureOut">
               <a:rPr lang="en-US" smtClean="0"/>
-              <a:t>3/27/2018</a:t>
+              <a:t>7/9/2018</a:t>
             </a:fld>
             <a:endParaRPr lang="en-US"/>
           </a:p>
@@ -1153,7 +1154,7 @@
           <a:p>
             <a:fld id="{73F1DE3F-AD2E-4E31-AD04-7AD65E17B09F}" type="datetimeFigureOut">
               <a:rPr lang="en-US" smtClean="0"/>
-              <a:t>3/27/2018</a:t>
+              <a:t>7/9/2018</a:t>
             </a:fld>
             <a:endParaRPr lang="en-US"/>
           </a:p>
@@ -1418,7 +1419,7 @@
           <a:p>
             <a:fld id="{73F1DE3F-AD2E-4E31-AD04-7AD65E17B09F}" type="datetimeFigureOut">
               <a:rPr lang="en-US" smtClean="0"/>
-              <a:t>3/27/2018</a:t>
+              <a:t>7/9/2018</a:t>
             </a:fld>
             <a:endParaRPr lang="en-US"/>
           </a:p>
@@ -1830,7 +1831,7 @@
           <a:p>
             <a:fld id="{73F1DE3F-AD2E-4E31-AD04-7AD65E17B09F}" type="datetimeFigureOut">
               <a:rPr lang="en-US" smtClean="0"/>
-              <a:t>3/27/2018</a:t>
+              <a:t>7/9/2018</a:t>
             </a:fld>
             <a:endParaRPr lang="en-US"/>
           </a:p>
@@ -1971,7 +1972,7 @@
           <a:p>
             <a:fld id="{73F1DE3F-AD2E-4E31-AD04-7AD65E17B09F}" type="datetimeFigureOut">
               <a:rPr lang="en-US" smtClean="0"/>
-              <a:t>3/27/2018</a:t>
+              <a:t>7/9/2018</a:t>
             </a:fld>
             <a:endParaRPr lang="en-US"/>
           </a:p>
@@ -2084,7 +2085,7 @@
           <a:p>
             <a:fld id="{73F1DE3F-AD2E-4E31-AD04-7AD65E17B09F}" type="datetimeFigureOut">
               <a:rPr lang="en-US" smtClean="0"/>
-              <a:t>3/27/2018</a:t>
+              <a:t>7/9/2018</a:t>
             </a:fld>
             <a:endParaRPr lang="en-US"/>
           </a:p>
@@ -2395,7 +2396,7 @@
           <a:p>
             <a:fld id="{73F1DE3F-AD2E-4E31-AD04-7AD65E17B09F}" type="datetimeFigureOut">
               <a:rPr lang="en-US" smtClean="0"/>
-              <a:t>3/27/2018</a:t>
+              <a:t>7/9/2018</a:t>
             </a:fld>
             <a:endParaRPr lang="en-US"/>
           </a:p>
@@ -2683,7 +2684,7 @@
           <a:p>
             <a:fld id="{73F1DE3F-AD2E-4E31-AD04-7AD65E17B09F}" type="datetimeFigureOut">
               <a:rPr lang="en-US" smtClean="0"/>
-              <a:t>3/27/2018</a:t>
+              <a:t>7/9/2018</a:t>
             </a:fld>
             <a:endParaRPr lang="en-US"/>
           </a:p>
@@ -2924,7 +2925,7 @@
           <a:p>
             <a:fld id="{73F1DE3F-AD2E-4E31-AD04-7AD65E17B09F}" type="datetimeFigureOut">
               <a:rPr lang="en-US" smtClean="0"/>
-              <a:t>3/27/2018</a:t>
+              <a:t>7/9/2018</a:t>
             </a:fld>
             <a:endParaRPr lang="en-US"/>
           </a:p>
@@ -3469,6 +3470,160 @@
 </p:sld>
 </file>
 
+<file path=ppt/slides/slide10.xml><?xml version="1.0" encoding="utf-8"?>
+<p:sld xmlns:a="http://schemas.openxmlformats.org/drawingml/2006/main" xmlns:r="http://schemas.openxmlformats.org/officeDocument/2006/relationships" xmlns:p="http://schemas.openxmlformats.org/presentationml/2006/main">
+  <p:cSld>
+    <p:spTree>
+      <p:nvGrpSpPr>
+        <p:cNvPr id="1" name=""/>
+        <p:cNvGrpSpPr/>
+        <p:nvPr/>
+      </p:nvGrpSpPr>
+      <p:grpSpPr>
+        <a:xfrm>
+          <a:off x="0" y="0"/>
+          <a:ext cx="0" cy="0"/>
+          <a:chOff x="0" y="0"/>
+          <a:chExt cx="0" cy="0"/>
+        </a:xfrm>
+      </p:grpSpPr>
+      <p:pic>
+        <p:nvPicPr>
+          <p:cNvPr id="4" name="Picture 3">
+            <a:extLst>
+              <a:ext uri="{FF2B5EF4-FFF2-40B4-BE49-F238E27FC236}">
+                <a16:creationId xmlns:a16="http://schemas.microsoft.com/office/drawing/2014/main" id="{BC386614-F891-4DD1-AD89-9D8EC3844E7A}"/>
+              </a:ext>
+            </a:extLst>
+          </p:cNvPr>
+          <p:cNvPicPr>
+            <a:picLocks noChangeAspect="1"/>
+          </p:cNvPicPr>
+          <p:nvPr/>
+        </p:nvPicPr>
+        <p:blipFill>
+          <a:blip r:embed="rId3"/>
+          <a:stretch>
+            <a:fillRect/>
+          </a:stretch>
+        </p:blipFill>
+        <p:spPr>
+          <a:xfrm>
+            <a:off x="1479819" y="986821"/>
+            <a:ext cx="4047619" cy="4752381"/>
+          </a:xfrm>
+          <a:prstGeom prst="rect">
+            <a:avLst/>
+          </a:prstGeom>
+        </p:spPr>
+      </p:pic>
+      <p:cxnSp>
+        <p:nvCxnSpPr>
+          <p:cNvPr id="6" name="Straight Connector 5">
+            <a:extLst>
+              <a:ext uri="{FF2B5EF4-FFF2-40B4-BE49-F238E27FC236}">
+                <a16:creationId xmlns:a16="http://schemas.microsoft.com/office/drawing/2014/main" id="{776EEA6E-EA78-4AFE-BBAA-69FEEA6C6260}"/>
+              </a:ext>
+            </a:extLst>
+          </p:cNvPr>
+          <p:cNvCxnSpPr/>
+          <p:nvPr/>
+        </p:nvCxnSpPr>
+        <p:spPr>
+          <a:xfrm>
+            <a:off x="5967167" y="1187777"/>
+            <a:ext cx="0" cy="4440025"/>
+          </a:xfrm>
+          <a:prstGeom prst="line">
+            <a:avLst/>
+          </a:prstGeom>
+          <a:ln w="76200">
+            <a:solidFill>
+              <a:schemeClr val="tx1"/>
+            </a:solidFill>
+          </a:ln>
+        </p:spPr>
+        <p:style>
+          <a:lnRef idx="1">
+            <a:schemeClr val="accent1"/>
+          </a:lnRef>
+          <a:fillRef idx="0">
+            <a:schemeClr val="accent1"/>
+          </a:fillRef>
+          <a:effectRef idx="0">
+            <a:schemeClr val="accent1"/>
+          </a:effectRef>
+          <a:fontRef idx="minor">
+            <a:schemeClr val="tx1"/>
+          </a:fontRef>
+        </p:style>
+      </p:cxnSp>
+      <p:sp>
+        <p:nvSpPr>
+          <p:cNvPr id="7" name="TextBox 6">
+            <a:extLst>
+              <a:ext uri="{FF2B5EF4-FFF2-40B4-BE49-F238E27FC236}">
+                <a16:creationId xmlns:a16="http://schemas.microsoft.com/office/drawing/2014/main" id="{12DD9BC4-752C-4261-B472-C317EDF9DCE4}"/>
+              </a:ext>
+            </a:extLst>
+          </p:cNvPr>
+          <p:cNvSpPr txBox="1"/>
+          <p:nvPr/>
+        </p:nvSpPr>
+        <p:spPr>
+          <a:xfrm>
+            <a:off x="6340979" y="1546788"/>
+            <a:ext cx="5100172" cy="4154984"/>
+          </a:xfrm>
+          <a:prstGeom prst="rect">
+            <a:avLst/>
+          </a:prstGeom>
+          <a:noFill/>
+        </p:spPr>
+        <p:txBody>
+          <a:bodyPr wrap="square" rtlCol="0">
+            <a:spAutoFit/>
+          </a:bodyPr>
+          <a:lstStyle/>
+          <a:p>
+            <a:r>
+              <a:rPr lang="en-US" sz="4400" b="1" dirty="0"/>
+              <a:t>Test Drive</a:t>
+            </a:r>
+          </a:p>
+          <a:p>
+            <a:r>
+              <a:rPr lang="en-US" sz="4400" b="1" dirty="0"/>
+              <a:t>Workshop</a:t>
+            </a:r>
+          </a:p>
+          <a:p>
+            <a:endParaRPr lang="en-US" sz="4400" b="1" dirty="0"/>
+          </a:p>
+          <a:p>
+            <a:r>
+              <a:rPr lang="en-US" sz="4400" b="1" dirty="0"/>
+              <a:t>Lab 900: Create Data Visualizations from ADWC</a:t>
+            </a:r>
+          </a:p>
+        </p:txBody>
+      </p:sp>
+    </p:spTree>
+    <p:custDataLst>
+      <p:tags r:id="rId1"/>
+    </p:custDataLst>
+    <p:extLst>
+      <p:ext uri="{BB962C8B-B14F-4D97-AF65-F5344CB8AC3E}">
+        <p14:creationId xmlns:p14="http://schemas.microsoft.com/office/powerpoint/2010/main" val="2597448590"/>
+      </p:ext>
+    </p:extLst>
+  </p:cSld>
+  <p:clrMapOvr>
+    <a:masterClrMapping/>
+  </p:clrMapOvr>
+</p:sld>
+</file>
+
 <file path=ppt/slides/slide2.xml><?xml version="1.0" encoding="utf-8"?>
 <p:sld xmlns:a="http://schemas.openxmlformats.org/drawingml/2006/main" xmlns:r="http://schemas.openxmlformats.org/officeDocument/2006/relationships" xmlns:p="http://schemas.openxmlformats.org/presentationml/2006/main">
   <p:cSld>
@@ -4769,6 +4924,12 @@
 </file>
 
 <file path=ppt/tags/tag10.xml><?xml version="1.0" encoding="utf-8"?>
+<p:tagLst xmlns:a="http://schemas.openxmlformats.org/drawingml/2006/main" xmlns:r="http://schemas.openxmlformats.org/officeDocument/2006/relationships" xmlns:p="http://schemas.openxmlformats.org/presentationml/2006/main">
+  <p:tag name="ARTICULATE_SLIDE_THUMBNAIL_REFRESH" val="1"/>
+</p:tagLst>
+</file>
+
+<file path=ppt/tags/tag11.xml><?xml version="1.0" encoding="utf-8"?>
 <p:tagLst xmlns:a="http://schemas.openxmlformats.org/drawingml/2006/main" xmlns:r="http://schemas.openxmlformats.org/officeDocument/2006/relationships" xmlns:p="http://schemas.openxmlformats.org/presentationml/2006/main">
   <p:tag name="ARTICULATE_SLIDE_THUMBNAIL_REFRESH" val="1"/>
 </p:tagLst>

</xml_diff>